<commit_message>
Mostly related to images, methodology, typos etc
</commit_message>
<xml_diff>
--- a/graphs/CloudSuite.pptx
+++ b/graphs/CloudSuite.pptx
@@ -104,6 +104,11 @@
       </a:defRPr>
     </a:lvl9pPr>
   </p:defaultTextStyle>
+  <p:extLst>
+    <p:ext uri="{EFAFB233-063F-42B5-8137-9DF3F51BA10A}">
+      <p15:sldGuideLst xmlns:p15="http://schemas.microsoft.com/office/powerpoint/2012/main"/>
+    </p:ext>
+  </p:extLst>
 </p:presentation>
 </file>
 
@@ -581,11 +586,11 @@
         </c:dLbls>
         <c:gapWidth val="73"/>
         <c:overlap val="6"/>
-        <c:axId val="-660120688"/>
-        <c:axId val="-660126672"/>
+        <c:axId val="-2142950048"/>
+        <c:axId val="-2142944064"/>
       </c:barChart>
       <c:catAx>
-        <c:axId val="-660120688"/>
+        <c:axId val="-2142950048"/>
         <c:scaling>
           <c:orientation val="minMax"/>
         </c:scaling>
@@ -610,20 +615,17 @@
             <a:pPr>
               <a:defRPr sz="3200" b="0" i="0" u="none" strike="noStrike" kern="1200" baseline="0">
                 <a:solidFill>
-                  <a:schemeClr val="tx1">
-                    <a:lumMod val="65000"/>
-                    <a:lumOff val="35000"/>
-                  </a:schemeClr>
+                  <a:schemeClr val="tx1"/>
                 </a:solidFill>
-                <a:latin typeface="+mn-lt"/>
+                <a:latin typeface="Times New Roman" panose="02020603050405020304" pitchFamily="18" charset="0"/>
                 <a:ea typeface="+mn-ea"/>
-                <a:cs typeface="+mn-cs"/>
+                <a:cs typeface="Times New Roman" panose="02020603050405020304" pitchFamily="18" charset="0"/>
               </a:defRPr>
             </a:pPr>
             <a:endParaRPr lang="en-US"/>
           </a:p>
         </c:txPr>
-        <c:crossAx val="-660126672"/>
+        <c:crossAx val="-2142944064"/>
         <c:crosses val="autoZero"/>
         <c:auto val="0"/>
         <c:lblAlgn val="ctr"/>
@@ -632,7 +634,7 @@
         <c:noMultiLvlLbl val="0"/>
       </c:catAx>
       <c:valAx>
-        <c:axId val="-660126672"/>
+        <c:axId val="-2142944064"/>
         <c:scaling>
           <c:orientation val="minMax"/>
           <c:max val="1.07"/>
@@ -677,18 +679,21 @@
                 <a:pPr>
                   <a:defRPr sz="3600" b="0" i="0" u="none" strike="noStrike" kern="1200" baseline="0">
                     <a:solidFill>
-                      <a:schemeClr val="tx1">
-                        <a:lumMod val="65000"/>
-                        <a:lumOff val="35000"/>
-                      </a:schemeClr>
+                      <a:schemeClr val="tx1"/>
                     </a:solidFill>
-                    <a:latin typeface="+mn-lt"/>
+                    <a:latin typeface="Times New Roman" panose="02020603050405020304" pitchFamily="18" charset="0"/>
                     <a:ea typeface="+mn-ea"/>
-                    <a:cs typeface="+mn-cs"/>
+                    <a:cs typeface="Times New Roman" panose="02020603050405020304" pitchFamily="18" charset="0"/>
                   </a:defRPr>
                 </a:pPr>
                 <a:r>
-                  <a:rPr lang="en-US" sz="3600" dirty="0"/>
+                  <a:rPr lang="en-US" sz="3600" dirty="0">
+                    <a:solidFill>
+                      <a:schemeClr val="tx1"/>
+                    </a:solidFill>
+                    <a:latin typeface="Times New Roman" panose="02020603050405020304" pitchFamily="18" charset="0"/>
+                    <a:cs typeface="Times New Roman" panose="02020603050405020304" pitchFamily="18" charset="0"/>
+                  </a:rPr>
                   <a:t>Speedup over baseline</a:t>
                 </a:r>
               </a:p>
@@ -717,14 +722,11 @@
               <a:pPr>
                 <a:defRPr sz="3600" b="0" i="0" u="none" strike="noStrike" kern="1200" baseline="0">
                   <a:solidFill>
-                    <a:schemeClr val="tx1">
-                      <a:lumMod val="65000"/>
-                      <a:lumOff val="35000"/>
-                    </a:schemeClr>
+                    <a:schemeClr val="tx1"/>
                   </a:solidFill>
-                  <a:latin typeface="+mn-lt"/>
+                  <a:latin typeface="Times New Roman" panose="02020603050405020304" pitchFamily="18" charset="0"/>
                   <a:ea typeface="+mn-ea"/>
-                  <a:cs typeface="+mn-cs"/>
+                  <a:cs typeface="Times New Roman" panose="02020603050405020304" pitchFamily="18" charset="0"/>
                 </a:defRPr>
               </a:pPr>
               <a:endParaRPr lang="en-US"/>
@@ -749,20 +751,17 @@
             <a:pPr>
               <a:defRPr sz="2400" b="0" i="0" u="none" strike="noStrike" kern="1200" baseline="0">
                 <a:solidFill>
-                  <a:schemeClr val="tx1">
-                    <a:lumMod val="65000"/>
-                    <a:lumOff val="35000"/>
-                  </a:schemeClr>
+                  <a:schemeClr val="tx1"/>
                 </a:solidFill>
-                <a:latin typeface="+mn-lt"/>
+                <a:latin typeface="Times New Roman" panose="02020603050405020304" pitchFamily="18" charset="0"/>
                 <a:ea typeface="+mn-ea"/>
-                <a:cs typeface="+mn-cs"/>
+                <a:cs typeface="Times New Roman" panose="02020603050405020304" pitchFamily="18" charset="0"/>
               </a:defRPr>
             </a:pPr>
             <a:endParaRPr lang="en-US"/>
           </a:p>
         </c:txPr>
-        <c:crossAx val="-660120688"/>
+        <c:crossAx val="-2142950048"/>
         <c:crosses val="autoZero"/>
         <c:crossBetween val="between"/>
       </c:valAx>
@@ -801,14 +800,11 @@
           <a:pPr>
             <a:defRPr sz="3200" b="0" i="0" u="none" strike="noStrike" kern="1200" baseline="0">
               <a:solidFill>
-                <a:schemeClr val="tx1">
-                  <a:lumMod val="65000"/>
-                  <a:lumOff val="35000"/>
-                </a:schemeClr>
+                <a:schemeClr val="tx1"/>
               </a:solidFill>
-              <a:latin typeface="+mn-lt"/>
+              <a:latin typeface="Times New Roman" panose="02020603050405020304" pitchFamily="18" charset="0"/>
               <a:ea typeface="+mn-ea"/>
-              <a:cs typeface="+mn-cs"/>
+              <a:cs typeface="Times New Roman" panose="02020603050405020304" pitchFamily="18" charset="0"/>
             </a:defRPr>
           </a:pPr>
           <a:endParaRPr lang="en-US"/>
@@ -1519,7 +1515,7 @@
           <a:p>
             <a:fld id="{FD81BD2D-2A50-436A-B879-ED5994D77D3B}" type="datetimeFigureOut">
               <a:rPr lang="en-IN" smtClean="0"/>
-              <a:t>04-12-2018</a:t>
+              <a:t>06-12-2018</a:t>
             </a:fld>
             <a:endParaRPr lang="en-IN"/>
           </a:p>
@@ -1689,7 +1685,7 @@
           <a:p>
             <a:fld id="{FD81BD2D-2A50-436A-B879-ED5994D77D3B}" type="datetimeFigureOut">
               <a:rPr lang="en-IN" smtClean="0"/>
-              <a:t>04-12-2018</a:t>
+              <a:t>06-12-2018</a:t>
             </a:fld>
             <a:endParaRPr lang="en-IN"/>
           </a:p>
@@ -1869,7 +1865,7 @@
           <a:p>
             <a:fld id="{FD81BD2D-2A50-436A-B879-ED5994D77D3B}" type="datetimeFigureOut">
               <a:rPr lang="en-IN" smtClean="0"/>
-              <a:t>04-12-2018</a:t>
+              <a:t>06-12-2018</a:t>
             </a:fld>
             <a:endParaRPr lang="en-IN"/>
           </a:p>
@@ -2039,7 +2035,7 @@
           <a:p>
             <a:fld id="{FD81BD2D-2A50-436A-B879-ED5994D77D3B}" type="datetimeFigureOut">
               <a:rPr lang="en-IN" smtClean="0"/>
-              <a:t>04-12-2018</a:t>
+              <a:t>06-12-2018</a:t>
             </a:fld>
             <a:endParaRPr lang="en-IN"/>
           </a:p>
@@ -2285,7 +2281,7 @@
           <a:p>
             <a:fld id="{FD81BD2D-2A50-436A-B879-ED5994D77D3B}" type="datetimeFigureOut">
               <a:rPr lang="en-IN" smtClean="0"/>
-              <a:t>04-12-2018</a:t>
+              <a:t>06-12-2018</a:t>
             </a:fld>
             <a:endParaRPr lang="en-IN"/>
           </a:p>
@@ -2517,7 +2513,7 @@
           <a:p>
             <a:fld id="{FD81BD2D-2A50-436A-B879-ED5994D77D3B}" type="datetimeFigureOut">
               <a:rPr lang="en-IN" smtClean="0"/>
-              <a:t>04-12-2018</a:t>
+              <a:t>06-12-2018</a:t>
             </a:fld>
             <a:endParaRPr lang="en-IN"/>
           </a:p>
@@ -2884,7 +2880,7 @@
           <a:p>
             <a:fld id="{FD81BD2D-2A50-436A-B879-ED5994D77D3B}" type="datetimeFigureOut">
               <a:rPr lang="en-IN" smtClean="0"/>
-              <a:t>04-12-2018</a:t>
+              <a:t>06-12-2018</a:t>
             </a:fld>
             <a:endParaRPr lang="en-IN"/>
           </a:p>
@@ -3002,7 +2998,7 @@
           <a:p>
             <a:fld id="{FD81BD2D-2A50-436A-B879-ED5994D77D3B}" type="datetimeFigureOut">
               <a:rPr lang="en-IN" smtClean="0"/>
-              <a:t>04-12-2018</a:t>
+              <a:t>06-12-2018</a:t>
             </a:fld>
             <a:endParaRPr lang="en-IN"/>
           </a:p>
@@ -3097,7 +3093,7 @@
           <a:p>
             <a:fld id="{FD81BD2D-2A50-436A-B879-ED5994D77D3B}" type="datetimeFigureOut">
               <a:rPr lang="en-IN" smtClean="0"/>
-              <a:t>04-12-2018</a:t>
+              <a:t>06-12-2018</a:t>
             </a:fld>
             <a:endParaRPr lang="en-IN"/>
           </a:p>
@@ -3374,7 +3370,7 @@
           <a:p>
             <a:fld id="{FD81BD2D-2A50-436A-B879-ED5994D77D3B}" type="datetimeFigureOut">
               <a:rPr lang="en-IN" smtClean="0"/>
-              <a:t>04-12-2018</a:t>
+              <a:t>06-12-2018</a:t>
             </a:fld>
             <a:endParaRPr lang="en-IN"/>
           </a:p>
@@ -3631,7 +3627,7 @@
           <a:p>
             <a:fld id="{FD81BD2D-2A50-436A-B879-ED5994D77D3B}" type="datetimeFigureOut">
               <a:rPr lang="en-IN" smtClean="0"/>
-              <a:t>04-12-2018</a:t>
+              <a:t>06-12-2018</a:t>
             </a:fld>
             <a:endParaRPr lang="en-IN"/>
           </a:p>
@@ -3844,7 +3840,7 @@
           <a:p>
             <a:fld id="{FD81BD2D-2A50-436A-B879-ED5994D77D3B}" type="datetimeFigureOut">
               <a:rPr lang="en-IN" smtClean="0"/>
-              <a:t>04-12-2018</a:t>
+              <a:t>06-12-2018</a:t>
             </a:fld>
             <a:endParaRPr lang="en-IN"/>
           </a:p>
@@ -4258,7 +4254,7 @@
           <p:nvPr>
             <p:extLst>
               <p:ext uri="{D42A27DB-BD31-4B8C-83A1-F6EECF244321}">
-                <p14:modId xmlns:p14="http://schemas.microsoft.com/office/powerpoint/2010/main" val="3538206630"/>
+                <p14:modId xmlns:p14="http://schemas.microsoft.com/office/powerpoint/2010/main" val="4211003994"/>
               </p:ext>
             </p:extLst>
           </p:nvPr>

</xml_diff>

<commit_message>
Condensing for space, Coverage and CrossVal Images
</commit_message>
<xml_diff>
--- a/graphs/CloudSuite.pptx
+++ b/graphs/CloudSuite.pptx
@@ -449,11 +449,11 @@
         </c:dLbls>
         <c:gapWidth val="73"/>
         <c:overlap val="6"/>
-        <c:axId val="-738300112"/>
-        <c:axId val="-738299568"/>
+        <c:axId val="1629977056"/>
+        <c:axId val="1629972704"/>
       </c:barChart>
       <c:catAx>
-        <c:axId val="-738300112"/>
+        <c:axId val="1629977056"/>
         <c:scaling>
           <c:orientation val="minMax"/>
         </c:scaling>
@@ -488,7 +488,7 @@
             <a:endParaRPr lang="en-US"/>
           </a:p>
         </c:txPr>
-        <c:crossAx val="-738299568"/>
+        <c:crossAx val="1629972704"/>
         <c:crosses val="autoZero"/>
         <c:auto val="0"/>
         <c:lblAlgn val="ctr"/>
@@ -497,7 +497,7 @@
         <c:noMultiLvlLbl val="0"/>
       </c:catAx>
       <c:valAx>
-        <c:axId val="-738299568"/>
+        <c:axId val="1629972704"/>
         <c:scaling>
           <c:orientation val="minMax"/>
           <c:max val="1.07"/>
@@ -550,15 +550,22 @@
                   </a:defRPr>
                 </a:pPr>
                 <a:r>
-                  <a:rPr lang="en-US" sz="3600" dirty="0">
+                  <a:rPr lang="en-US" sz="3600" dirty="0" smtClean="0">
                     <a:solidFill>
                       <a:schemeClr val="tx1"/>
                     </a:solidFill>
                     <a:latin typeface="Times New Roman" panose="02020603050405020304" pitchFamily="18" charset="0"/>
                     <a:cs typeface="Times New Roman" panose="02020603050405020304" pitchFamily="18" charset="0"/>
                   </a:rPr>
-                  <a:t>Speedup over baseline</a:t>
+                  <a:t>IPC Speedup</a:t>
                 </a:r>
+                <a:endParaRPr lang="en-US" sz="3600" dirty="0">
+                  <a:solidFill>
+                    <a:schemeClr val="tx1"/>
+                  </a:solidFill>
+                  <a:latin typeface="Times New Roman" panose="02020603050405020304" pitchFamily="18" charset="0"/>
+                  <a:cs typeface="Times New Roman" panose="02020603050405020304" pitchFamily="18" charset="0"/>
+                </a:endParaRPr>
               </a:p>
             </c:rich>
           </c:tx>
@@ -566,8 +573,8 @@
             <c:manualLayout>
               <c:xMode val="edge"/>
               <c:yMode val="edge"/>
-              <c:x val="6.983431758530184E-3"/>
-              <c:y val="5.629459053467372E-2"/>
+              <c:x val="1.1150098425196851E-2"/>
+              <c:y val="0.2270262787273542"/>
             </c:manualLayout>
           </c:layout>
           <c:overlay val="0"/>
@@ -624,7 +631,7 @@
             <a:endParaRPr lang="en-US"/>
           </a:p>
         </c:txPr>
-        <c:crossAx val="-738300112"/>
+        <c:crossAx val="1629977056"/>
         <c:crosses val="autoZero"/>
         <c:crossBetween val="between"/>
       </c:valAx>
@@ -4117,7 +4124,7 @@
           <p:nvPr>
             <p:extLst>
               <p:ext uri="{D42A27DB-BD31-4B8C-83A1-F6EECF244321}">
-                <p14:modId xmlns:p14="http://schemas.microsoft.com/office/powerpoint/2010/main" val="4211003994"/>
+                <p14:modId xmlns:p14="http://schemas.microsoft.com/office/powerpoint/2010/main" val="737106578"/>
               </p:ext>
             </p:extLst>
           </p:nvPr>

</xml_diff>